<commit_message>
Updating PPT and adding Readme
</commit_message>
<xml_diff>
--- a/Presentation/Presentation.pptx
+++ b/Presentation/Presentation.pptx
@@ -8,6 +8,14 @@
     <p:sldId id="256" r:id="rId2"/>
     <p:sldId id="257" r:id="rId3"/>
     <p:sldId id="258" r:id="rId4"/>
+    <p:sldId id="259" r:id="rId5"/>
+    <p:sldId id="261" r:id="rId6"/>
+    <p:sldId id="260" r:id="rId7"/>
+    <p:sldId id="263" r:id="rId8"/>
+    <p:sldId id="264" r:id="rId9"/>
+    <p:sldId id="265" r:id="rId10"/>
+    <p:sldId id="262" r:id="rId11"/>
+    <p:sldId id="266" r:id="rId12"/>
   </p:sldIdLst>
   <p:sldSz cx="12192000" cy="6858000"/>
   <p:notesSz cx="6858000" cy="9144000"/>
@@ -106,6 +114,11 @@
       </a:defRPr>
     </a:lvl9pPr>
   </p:defaultTextStyle>
+  <p:extLst>
+    <p:ext uri="{EFAFB233-063F-42B5-8137-9DF3F51BA10A}">
+      <p15:sldGuideLst xmlns:p15="http://schemas.microsoft.com/office/powerpoint/2012/main"/>
+    </p:ext>
+  </p:extLst>
 </p:presentation>
 </file>
 
@@ -295,7 +308,7 @@
           <a:p>
             <a:fld id="{E367115D-411E-43B4-95D0-14EFFC5B0289}" type="datetimeFigureOut">
               <a:rPr lang="en-IN" smtClean="0"/>
-              <a:t>21-04-2023</a:t>
+              <a:t>21-05-2023</a:t>
             </a:fld>
             <a:endParaRPr lang="en-IN"/>
           </a:p>
@@ -570,7 +583,7 @@
           <a:p>
             <a:fld id="{E367115D-411E-43B4-95D0-14EFFC5B0289}" type="datetimeFigureOut">
               <a:rPr lang="en-IN" smtClean="0"/>
-              <a:t>21-04-2023</a:t>
+              <a:t>21-05-2023</a:t>
             </a:fld>
             <a:endParaRPr lang="en-IN"/>
           </a:p>
@@ -764,7 +777,7 @@
           <a:p>
             <a:fld id="{E367115D-411E-43B4-95D0-14EFFC5B0289}" type="datetimeFigureOut">
               <a:rPr lang="en-IN" smtClean="0"/>
-              <a:t>21-04-2023</a:t>
+              <a:t>21-05-2023</a:t>
             </a:fld>
             <a:endParaRPr lang="en-IN"/>
           </a:p>
@@ -1037,7 +1050,7 @@
           <a:p>
             <a:fld id="{E367115D-411E-43B4-95D0-14EFFC5B0289}" type="datetimeFigureOut">
               <a:rPr lang="en-IN" smtClean="0"/>
-              <a:t>21-04-2023</a:t>
+              <a:t>21-05-2023</a:t>
             </a:fld>
             <a:endParaRPr lang="en-IN"/>
           </a:p>
@@ -1378,7 +1391,7 @@
           <a:p>
             <a:fld id="{E367115D-411E-43B4-95D0-14EFFC5B0289}" type="datetimeFigureOut">
               <a:rPr lang="en-IN" smtClean="0"/>
-              <a:t>21-04-2023</a:t>
+              <a:t>21-05-2023</a:t>
             </a:fld>
             <a:endParaRPr lang="en-IN"/>
           </a:p>
@@ -2001,7 +2014,7 @@
           <a:p>
             <a:fld id="{E367115D-411E-43B4-95D0-14EFFC5B0289}" type="datetimeFigureOut">
               <a:rPr lang="en-IN" smtClean="0"/>
-              <a:t>21-04-2023</a:t>
+              <a:t>21-05-2023</a:t>
             </a:fld>
             <a:endParaRPr lang="en-IN"/>
           </a:p>
@@ -2861,7 +2874,7 @@
           <a:p>
             <a:fld id="{E367115D-411E-43B4-95D0-14EFFC5B0289}" type="datetimeFigureOut">
               <a:rPr lang="en-IN" smtClean="0"/>
-              <a:t>21-04-2023</a:t>
+              <a:t>21-05-2023</a:t>
             </a:fld>
             <a:endParaRPr lang="en-IN"/>
           </a:p>
@@ -3031,7 +3044,7 @@
           <a:p>
             <a:fld id="{E367115D-411E-43B4-95D0-14EFFC5B0289}" type="datetimeFigureOut">
               <a:rPr lang="en-IN" smtClean="0"/>
-              <a:t>21-04-2023</a:t>
+              <a:t>21-05-2023</a:t>
             </a:fld>
             <a:endParaRPr lang="en-IN"/>
           </a:p>
@@ -3211,7 +3224,7 @@
           <a:p>
             <a:fld id="{E367115D-411E-43B4-95D0-14EFFC5B0289}" type="datetimeFigureOut">
               <a:rPr lang="en-IN" smtClean="0"/>
-              <a:t>21-04-2023</a:t>
+              <a:t>21-05-2023</a:t>
             </a:fld>
             <a:endParaRPr lang="en-IN"/>
           </a:p>
@@ -3381,7 +3394,7 @@
           <a:p>
             <a:fld id="{E367115D-411E-43B4-95D0-14EFFC5B0289}" type="datetimeFigureOut">
               <a:rPr lang="en-IN" smtClean="0"/>
-              <a:t>21-04-2023</a:t>
+              <a:t>21-05-2023</a:t>
             </a:fld>
             <a:endParaRPr lang="en-IN"/>
           </a:p>
@@ -3628,7 +3641,7 @@
           <a:p>
             <a:fld id="{E367115D-411E-43B4-95D0-14EFFC5B0289}" type="datetimeFigureOut">
               <a:rPr lang="en-IN" smtClean="0"/>
-              <a:t>21-04-2023</a:t>
+              <a:t>21-05-2023</a:t>
             </a:fld>
             <a:endParaRPr lang="en-IN"/>
           </a:p>
@@ -3920,7 +3933,7 @@
           <a:p>
             <a:fld id="{E367115D-411E-43B4-95D0-14EFFC5B0289}" type="datetimeFigureOut">
               <a:rPr lang="en-IN" smtClean="0"/>
-              <a:t>21-04-2023</a:t>
+              <a:t>21-05-2023</a:t>
             </a:fld>
             <a:endParaRPr lang="en-IN"/>
           </a:p>
@@ -4364,7 +4377,7 @@
           <a:p>
             <a:fld id="{E367115D-411E-43B4-95D0-14EFFC5B0289}" type="datetimeFigureOut">
               <a:rPr lang="en-IN" smtClean="0"/>
-              <a:t>21-04-2023</a:t>
+              <a:t>21-05-2023</a:t>
             </a:fld>
             <a:endParaRPr lang="en-IN"/>
           </a:p>
@@ -4482,7 +4495,7 @@
           <a:p>
             <a:fld id="{E367115D-411E-43B4-95D0-14EFFC5B0289}" type="datetimeFigureOut">
               <a:rPr lang="en-IN" smtClean="0"/>
-              <a:t>21-04-2023</a:t>
+              <a:t>21-05-2023</a:t>
             </a:fld>
             <a:endParaRPr lang="en-IN"/>
           </a:p>
@@ -4577,7 +4590,7 @@
           <a:p>
             <a:fld id="{E367115D-411E-43B4-95D0-14EFFC5B0289}" type="datetimeFigureOut">
               <a:rPr lang="en-IN" smtClean="0"/>
-              <a:t>21-04-2023</a:t>
+              <a:t>21-05-2023</a:t>
             </a:fld>
             <a:endParaRPr lang="en-IN"/>
           </a:p>
@@ -4856,7 +4869,7 @@
           <a:p>
             <a:fld id="{E367115D-411E-43B4-95D0-14EFFC5B0289}" type="datetimeFigureOut">
               <a:rPr lang="en-IN" smtClean="0"/>
-              <a:t>21-04-2023</a:t>
+              <a:t>21-05-2023</a:t>
             </a:fld>
             <a:endParaRPr lang="en-IN"/>
           </a:p>
@@ -5131,7 +5144,7 @@
           <a:p>
             <a:fld id="{E367115D-411E-43B4-95D0-14EFFC5B0289}" type="datetimeFigureOut">
               <a:rPr lang="en-IN" smtClean="0"/>
-              <a:t>21-04-2023</a:t>
+              <a:t>21-05-2023</a:t>
             </a:fld>
             <a:endParaRPr lang="en-IN"/>
           </a:p>
@@ -5560,7 +5573,7 @@
           <a:p>
             <a:fld id="{E367115D-411E-43B4-95D0-14EFFC5B0289}" type="datetimeFigureOut">
               <a:rPr lang="en-IN" smtClean="0"/>
-              <a:t>21-04-2023</a:t>
+              <a:t>21-05-2023</a:t>
             </a:fld>
             <a:endParaRPr lang="en-IN"/>
           </a:p>
@@ -6119,33 +6132,281 @@
       </p:sp>
       <p:sp>
         <p:nvSpPr>
-          <p:cNvPr id="3" name="Subtitle 2">
+          <p:cNvPr id="4" name="Subtitle 2">
             <a:extLst>
               <a:ext uri="{FF2B5EF4-FFF2-40B4-BE49-F238E27FC236}">
-                <a16:creationId xmlns:a16="http://schemas.microsoft.com/office/drawing/2014/main" id="{36C70A7D-29AC-BB57-E0C2-B04DD1FE07BD}"/>
+                <a16:creationId xmlns:a16="http://schemas.microsoft.com/office/drawing/2014/main" id="{750E05D6-62E3-207C-446D-4468E4916A22}"/>
               </a:ext>
             </a:extLst>
           </p:cNvPr>
-          <p:cNvSpPr>
-            <a:spLocks noGrp="1"/>
-          </p:cNvSpPr>
-          <p:nvPr>
-            <p:ph type="subTitle" idx="1"/>
-          </p:nvPr>
+          <p:cNvSpPr txBox="1">
+            <a:spLocks/>
+          </p:cNvSpPr>
+          <p:nvPr/>
         </p:nvSpPr>
         <p:spPr>
           <a:xfrm>
-            <a:off x="3869875" y="4777381"/>
+            <a:off x="4407203" y="4765946"/>
             <a:ext cx="8825658" cy="861420"/>
           </a:xfrm>
+          <a:prstGeom prst="rect">
+            <a:avLst/>
+          </a:prstGeom>
         </p:spPr>
         <p:txBody>
-          <a:bodyPr/>
-          <a:lstStyle/>
+          <a:bodyPr vert="horz" lIns="91440" tIns="45720" rIns="91440" bIns="45720" rtlCol="0" anchor="t">
+            <a:normAutofit/>
+          </a:bodyPr>
+          <a:lstStyle>
+            <a:lvl1pPr marL="0" indent="0" algn="l" defTabSz="457200" rtl="0" eaLnBrk="1" latinLnBrk="0" hangingPunct="1">
+              <a:spcBef>
+                <a:spcPts val="1000"/>
+              </a:spcBef>
+              <a:spcAft>
+                <a:spcPts val="0"/>
+              </a:spcAft>
+              <a:buClr>
+                <a:schemeClr val="bg2">
+                  <a:lumMod val="40000"/>
+                  <a:lumOff val="60000"/>
+                </a:schemeClr>
+              </a:buClr>
+              <a:buSzPct val="80000"/>
+              <a:buFont typeface="Wingdings 3" charset="2"/>
+              <a:buNone/>
+              <a:defRPr sz="2000" b="0" i="0" kern="1200" cap="all">
+                <a:solidFill>
+                  <a:schemeClr val="bg2">
+                    <a:lumMod val="40000"/>
+                    <a:lumOff val="60000"/>
+                  </a:schemeClr>
+                </a:solidFill>
+                <a:latin typeface="+mj-lt"/>
+                <a:ea typeface="+mj-ea"/>
+                <a:cs typeface="+mj-cs"/>
+              </a:defRPr>
+            </a:lvl1pPr>
+            <a:lvl2pPr marL="457200" indent="0" algn="ctr" defTabSz="457200" rtl="0" eaLnBrk="1" latinLnBrk="0" hangingPunct="1">
+              <a:spcBef>
+                <a:spcPts val="1000"/>
+              </a:spcBef>
+              <a:spcAft>
+                <a:spcPts val="0"/>
+              </a:spcAft>
+              <a:buClr>
+                <a:schemeClr val="bg2">
+                  <a:lumMod val="40000"/>
+                  <a:lumOff val="60000"/>
+                </a:schemeClr>
+              </a:buClr>
+              <a:buSzPct val="80000"/>
+              <a:buFont typeface="Wingdings 3" charset="2"/>
+              <a:buNone/>
+              <a:defRPr sz="1800" b="0" i="0" kern="1200">
+                <a:solidFill>
+                  <a:schemeClr val="tx1">
+                    <a:tint val="75000"/>
+                  </a:schemeClr>
+                </a:solidFill>
+                <a:latin typeface="+mj-lt"/>
+                <a:ea typeface="+mj-ea"/>
+                <a:cs typeface="+mj-cs"/>
+              </a:defRPr>
+            </a:lvl2pPr>
+            <a:lvl3pPr marL="914400" indent="0" algn="ctr" defTabSz="457200" rtl="0" eaLnBrk="1" latinLnBrk="0" hangingPunct="1">
+              <a:spcBef>
+                <a:spcPts val="1000"/>
+              </a:spcBef>
+              <a:spcAft>
+                <a:spcPts val="0"/>
+              </a:spcAft>
+              <a:buClr>
+                <a:schemeClr val="bg2">
+                  <a:lumMod val="40000"/>
+                  <a:lumOff val="60000"/>
+                </a:schemeClr>
+              </a:buClr>
+              <a:buSzPct val="80000"/>
+              <a:buFont typeface="Wingdings 3" charset="2"/>
+              <a:buNone/>
+              <a:defRPr sz="1600" b="0" i="0" kern="1200">
+                <a:solidFill>
+                  <a:schemeClr val="tx1">
+                    <a:tint val="75000"/>
+                  </a:schemeClr>
+                </a:solidFill>
+                <a:latin typeface="+mj-lt"/>
+                <a:ea typeface="+mj-ea"/>
+                <a:cs typeface="+mj-cs"/>
+              </a:defRPr>
+            </a:lvl3pPr>
+            <a:lvl4pPr marL="1371600" indent="0" algn="ctr" defTabSz="457200" rtl="0" eaLnBrk="1" latinLnBrk="0" hangingPunct="1">
+              <a:spcBef>
+                <a:spcPts val="1000"/>
+              </a:spcBef>
+              <a:spcAft>
+                <a:spcPts val="0"/>
+              </a:spcAft>
+              <a:buClr>
+                <a:schemeClr val="bg2">
+                  <a:lumMod val="40000"/>
+                  <a:lumOff val="60000"/>
+                </a:schemeClr>
+              </a:buClr>
+              <a:buSzPct val="80000"/>
+              <a:buFont typeface="Wingdings 3" charset="2"/>
+              <a:buNone/>
+              <a:defRPr sz="1400" b="0" i="0" kern="1200">
+                <a:solidFill>
+                  <a:schemeClr val="tx1">
+                    <a:tint val="75000"/>
+                  </a:schemeClr>
+                </a:solidFill>
+                <a:latin typeface="+mj-lt"/>
+                <a:ea typeface="+mj-ea"/>
+                <a:cs typeface="+mj-cs"/>
+              </a:defRPr>
+            </a:lvl4pPr>
+            <a:lvl5pPr marL="1828800" indent="0" algn="ctr" defTabSz="457200" rtl="0" eaLnBrk="1" latinLnBrk="0" hangingPunct="1">
+              <a:spcBef>
+                <a:spcPts val="1000"/>
+              </a:spcBef>
+              <a:spcAft>
+                <a:spcPts val="0"/>
+              </a:spcAft>
+              <a:buClr>
+                <a:schemeClr val="bg2">
+                  <a:lumMod val="40000"/>
+                  <a:lumOff val="60000"/>
+                </a:schemeClr>
+              </a:buClr>
+              <a:buSzPct val="80000"/>
+              <a:buFont typeface="Wingdings 3" charset="2"/>
+              <a:buNone/>
+              <a:defRPr sz="1400" b="0" i="0" kern="1200">
+                <a:solidFill>
+                  <a:schemeClr val="tx1">
+                    <a:tint val="75000"/>
+                  </a:schemeClr>
+                </a:solidFill>
+                <a:latin typeface="+mj-lt"/>
+                <a:ea typeface="+mj-ea"/>
+                <a:cs typeface="+mj-cs"/>
+              </a:defRPr>
+            </a:lvl5pPr>
+            <a:lvl6pPr marL="2286000" indent="0" algn="ctr" defTabSz="457200" rtl="0" eaLnBrk="1" latinLnBrk="0" hangingPunct="1">
+              <a:spcBef>
+                <a:spcPts val="1000"/>
+              </a:spcBef>
+              <a:spcAft>
+                <a:spcPts val="0"/>
+              </a:spcAft>
+              <a:buClr>
+                <a:schemeClr val="bg2">
+                  <a:lumMod val="40000"/>
+                  <a:lumOff val="60000"/>
+                </a:schemeClr>
+              </a:buClr>
+              <a:buSzPct val="80000"/>
+              <a:buFont typeface="Wingdings 3" charset="2"/>
+              <a:buNone/>
+              <a:defRPr sz="1400" b="0" i="0" kern="1200">
+                <a:solidFill>
+                  <a:schemeClr val="tx1">
+                    <a:tint val="75000"/>
+                  </a:schemeClr>
+                </a:solidFill>
+                <a:latin typeface="+mj-lt"/>
+                <a:ea typeface="+mj-ea"/>
+                <a:cs typeface="+mj-cs"/>
+              </a:defRPr>
+            </a:lvl6pPr>
+            <a:lvl7pPr marL="2743200" indent="0" algn="ctr" defTabSz="457200" rtl="0" eaLnBrk="1" latinLnBrk="0" hangingPunct="1">
+              <a:spcBef>
+                <a:spcPts val="1000"/>
+              </a:spcBef>
+              <a:spcAft>
+                <a:spcPts val="0"/>
+              </a:spcAft>
+              <a:buClr>
+                <a:schemeClr val="bg2">
+                  <a:lumMod val="40000"/>
+                  <a:lumOff val="60000"/>
+                </a:schemeClr>
+              </a:buClr>
+              <a:buSzPct val="80000"/>
+              <a:buFont typeface="Wingdings 3" charset="2"/>
+              <a:buNone/>
+              <a:defRPr sz="1400" b="0" i="0" kern="1200">
+                <a:solidFill>
+                  <a:schemeClr val="tx1">
+                    <a:tint val="75000"/>
+                  </a:schemeClr>
+                </a:solidFill>
+                <a:latin typeface="+mj-lt"/>
+                <a:ea typeface="+mj-ea"/>
+                <a:cs typeface="+mj-cs"/>
+              </a:defRPr>
+            </a:lvl7pPr>
+            <a:lvl8pPr marL="3200400" indent="0" algn="ctr" defTabSz="457200" rtl="0" eaLnBrk="1" latinLnBrk="0" hangingPunct="1">
+              <a:spcBef>
+                <a:spcPts val="1000"/>
+              </a:spcBef>
+              <a:spcAft>
+                <a:spcPts val="0"/>
+              </a:spcAft>
+              <a:buClr>
+                <a:schemeClr val="bg2">
+                  <a:lumMod val="40000"/>
+                  <a:lumOff val="60000"/>
+                </a:schemeClr>
+              </a:buClr>
+              <a:buSzPct val="80000"/>
+              <a:buFont typeface="Wingdings 3" charset="2"/>
+              <a:buNone/>
+              <a:defRPr sz="1400" b="0" i="0" kern="1200">
+                <a:solidFill>
+                  <a:schemeClr val="tx1">
+                    <a:tint val="75000"/>
+                  </a:schemeClr>
+                </a:solidFill>
+                <a:latin typeface="+mj-lt"/>
+                <a:ea typeface="+mj-ea"/>
+                <a:cs typeface="+mj-cs"/>
+              </a:defRPr>
+            </a:lvl8pPr>
+            <a:lvl9pPr marL="3657600" indent="0" algn="ctr" defTabSz="457200" rtl="0" eaLnBrk="1" latinLnBrk="0" hangingPunct="1">
+              <a:spcBef>
+                <a:spcPts val="1000"/>
+              </a:spcBef>
+              <a:spcAft>
+                <a:spcPts val="0"/>
+              </a:spcAft>
+              <a:buClr>
+                <a:schemeClr val="bg2">
+                  <a:lumMod val="40000"/>
+                  <a:lumOff val="60000"/>
+                </a:schemeClr>
+              </a:buClr>
+              <a:buSzPct val="80000"/>
+              <a:buFont typeface="Wingdings 3" charset="2"/>
+              <a:buNone/>
+              <a:defRPr sz="1400" b="0" i="0" kern="1200">
+                <a:solidFill>
+                  <a:schemeClr val="tx1">
+                    <a:tint val="75000"/>
+                  </a:schemeClr>
+                </a:solidFill>
+                <a:latin typeface="+mj-lt"/>
+                <a:ea typeface="+mj-ea"/>
+                <a:cs typeface="+mj-cs"/>
+              </a:defRPr>
+            </a:lvl9pPr>
+          </a:lstStyle>
           <a:p>
             <a:r>
               <a:rPr lang="en-IN" dirty="0"/>
-              <a:t>Using Machine Learning</a:t>
+              <a:t>By YASH VATS</a:t>
             </a:r>
           </a:p>
         </p:txBody>
@@ -6154,6 +6415,474 @@
     <p:extLst>
       <p:ext uri="{BB962C8B-B14F-4D97-AF65-F5344CB8AC3E}">
         <p14:creationId xmlns:p14="http://schemas.microsoft.com/office/powerpoint/2010/main" val="518037098"/>
+      </p:ext>
+    </p:extLst>
+  </p:cSld>
+  <p:clrMapOvr>
+    <a:masterClrMapping/>
+  </p:clrMapOvr>
+</p:sld>
+</file>
+
+<file path=ppt/slides/slide10.xml><?xml version="1.0" encoding="utf-8"?>
+<p:sld xmlns:a="http://schemas.openxmlformats.org/drawingml/2006/main" xmlns:r="http://schemas.openxmlformats.org/officeDocument/2006/relationships" xmlns:p="http://schemas.openxmlformats.org/presentationml/2006/main">
+  <p:cSld>
+    <p:spTree>
+      <p:nvGrpSpPr>
+        <p:cNvPr id="1" name=""/>
+        <p:cNvGrpSpPr/>
+        <p:nvPr/>
+      </p:nvGrpSpPr>
+      <p:grpSpPr>
+        <a:xfrm>
+          <a:off x="0" y="0"/>
+          <a:ext cx="0" cy="0"/>
+          <a:chOff x="0" y="0"/>
+          <a:chExt cx="0" cy="0"/>
+        </a:xfrm>
+      </p:grpSpPr>
+      <p:sp>
+        <p:nvSpPr>
+          <p:cNvPr id="2" name="Title 1">
+            <a:extLst>
+              <a:ext uri="{FF2B5EF4-FFF2-40B4-BE49-F238E27FC236}">
+                <a16:creationId xmlns:a16="http://schemas.microsoft.com/office/drawing/2014/main" id="{77849803-4DE2-517C-81DA-D9943096D1CC}"/>
+              </a:ext>
+            </a:extLst>
+          </p:cNvPr>
+          <p:cNvSpPr>
+            <a:spLocks noGrp="1"/>
+          </p:cNvSpPr>
+          <p:nvPr>
+            <p:ph type="title"/>
+          </p:nvPr>
+        </p:nvSpPr>
+        <p:spPr/>
+        <p:txBody>
+          <a:bodyPr/>
+          <a:lstStyle/>
+          <a:p>
+            <a:r>
+              <a:rPr lang="en-IN" dirty="0"/>
+              <a:t>Issues Faced</a:t>
+            </a:r>
+          </a:p>
+        </p:txBody>
+      </p:sp>
+      <p:sp>
+        <p:nvSpPr>
+          <p:cNvPr id="3" name="Content Placeholder 2">
+            <a:extLst>
+              <a:ext uri="{FF2B5EF4-FFF2-40B4-BE49-F238E27FC236}">
+                <a16:creationId xmlns:a16="http://schemas.microsoft.com/office/drawing/2014/main" id="{10CF7294-09F7-C49B-0B9A-EBF59B47BD45}"/>
+              </a:ext>
+            </a:extLst>
+          </p:cNvPr>
+          <p:cNvSpPr>
+            <a:spLocks noGrp="1"/>
+          </p:cNvSpPr>
+          <p:nvPr>
+            <p:ph idx="1"/>
+          </p:nvPr>
+        </p:nvSpPr>
+        <p:spPr>
+          <a:xfrm>
+            <a:off x="646111" y="1762813"/>
+            <a:ext cx="10713188" cy="5192598"/>
+          </a:xfrm>
+        </p:spPr>
+        <p:txBody>
+          <a:bodyPr>
+            <a:normAutofit/>
+          </a:bodyPr>
+          <a:lstStyle/>
+          <a:p>
+            <a:r>
+              <a:rPr lang="en-US" sz="2400" dirty="0"/>
+              <a:t>Originally, the accuracy of the model was excellent, but its precision and recall were significantly low. To address this issue, the dataset was balanced prior to being inputted into the model.</a:t>
+            </a:r>
+          </a:p>
+          <a:p>
+            <a:endParaRPr lang="en-US" sz="2400" dirty="0"/>
+          </a:p>
+          <a:p>
+            <a:r>
+              <a:rPr lang="en-US" sz="2400" dirty="0"/>
+              <a:t>The analysis of feature correlation proved challenging due to the application of Principal Component Analysis (PCA) on the dataset.</a:t>
+            </a:r>
+          </a:p>
+          <a:p>
+            <a:endParaRPr lang="en-US" sz="2400" dirty="0"/>
+          </a:p>
+          <a:p>
+            <a:r>
+              <a:rPr lang="en-US" sz="2400" dirty="0"/>
+              <a:t>Since the outcome of K-Nearest Neighbors (KNN) is reliant on the initial value of K, the model underwent analysis using various K values before being pickled for future use.</a:t>
+            </a:r>
+            <a:endParaRPr lang="en-IN" sz="1800" dirty="0"/>
+          </a:p>
+          <a:p>
+            <a:endParaRPr lang="en-IN" sz="1800" dirty="0"/>
+          </a:p>
+          <a:p>
+            <a:endParaRPr lang="en-IN" sz="1800" dirty="0"/>
+          </a:p>
+        </p:txBody>
+      </p:sp>
+    </p:spTree>
+    <p:extLst>
+      <p:ext uri="{BB962C8B-B14F-4D97-AF65-F5344CB8AC3E}">
+        <p14:creationId xmlns:p14="http://schemas.microsoft.com/office/powerpoint/2010/main" val="3710110371"/>
+      </p:ext>
+    </p:extLst>
+  </p:cSld>
+  <p:clrMapOvr>
+    <a:masterClrMapping/>
+  </p:clrMapOvr>
+</p:sld>
+</file>
+
+<file path=ppt/slides/slide11.xml><?xml version="1.0" encoding="utf-8"?>
+<p:sld xmlns:a="http://schemas.openxmlformats.org/drawingml/2006/main" xmlns:r="http://schemas.openxmlformats.org/officeDocument/2006/relationships" xmlns:p="http://schemas.openxmlformats.org/presentationml/2006/main">
+  <p:cSld>
+    <p:spTree>
+      <p:nvGrpSpPr>
+        <p:cNvPr id="1" name=""/>
+        <p:cNvGrpSpPr/>
+        <p:nvPr/>
+      </p:nvGrpSpPr>
+      <p:grpSpPr>
+        <a:xfrm>
+          <a:off x="0" y="0"/>
+          <a:ext cx="0" cy="0"/>
+          <a:chOff x="0" y="0"/>
+          <a:chExt cx="0" cy="0"/>
+        </a:xfrm>
+      </p:grpSpPr>
+      <p:sp>
+        <p:nvSpPr>
+          <p:cNvPr id="2" name="Title 1">
+            <a:extLst>
+              <a:ext uri="{FF2B5EF4-FFF2-40B4-BE49-F238E27FC236}">
+                <a16:creationId xmlns:a16="http://schemas.microsoft.com/office/drawing/2014/main" id="{77849803-4DE2-517C-81DA-D9943096D1CC}"/>
+              </a:ext>
+            </a:extLst>
+          </p:cNvPr>
+          <p:cNvSpPr>
+            <a:spLocks noGrp="1"/>
+          </p:cNvSpPr>
+          <p:nvPr>
+            <p:ph type="title"/>
+          </p:nvPr>
+        </p:nvSpPr>
+        <p:spPr/>
+        <p:txBody>
+          <a:bodyPr/>
+          <a:lstStyle/>
+          <a:p>
+            <a:r>
+              <a:rPr lang="en-IN" dirty="0"/>
+              <a:t>Conclusion Drawn</a:t>
+            </a:r>
+          </a:p>
+        </p:txBody>
+      </p:sp>
+      <p:sp>
+        <p:nvSpPr>
+          <p:cNvPr id="3" name="Content Placeholder 2">
+            <a:extLst>
+              <a:ext uri="{FF2B5EF4-FFF2-40B4-BE49-F238E27FC236}">
+                <a16:creationId xmlns:a16="http://schemas.microsoft.com/office/drawing/2014/main" id="{10CF7294-09F7-C49B-0B9A-EBF59B47BD45}"/>
+              </a:ext>
+            </a:extLst>
+          </p:cNvPr>
+          <p:cNvSpPr>
+            <a:spLocks noGrp="1"/>
+          </p:cNvSpPr>
+          <p:nvPr>
+            <p:ph idx="1"/>
+          </p:nvPr>
+        </p:nvSpPr>
+        <p:spPr>
+          <a:xfrm>
+            <a:off x="938341" y="4091234"/>
+            <a:ext cx="10713188" cy="5192598"/>
+          </a:xfrm>
+        </p:spPr>
+        <p:txBody>
+          <a:bodyPr>
+            <a:normAutofit/>
+          </a:bodyPr>
+          <a:lstStyle/>
+          <a:p>
+            <a:endParaRPr lang="en-IN" sz="2400" dirty="0"/>
+          </a:p>
+          <a:p>
+            <a:endParaRPr lang="en-IN" sz="2400" dirty="0"/>
+          </a:p>
+          <a:p>
+            <a:pPr marL="0" indent="0">
+              <a:buNone/>
+            </a:pPr>
+            <a:r>
+              <a:rPr lang="en-IN" sz="2400" dirty="0"/>
+              <a:t>Highest Accuracy of 93.90% was achieved using Random Forest Classifier with an impressive F1 Score of 93.47%.</a:t>
+            </a:r>
+            <a:endParaRPr lang="en-IN" sz="1800" dirty="0"/>
+          </a:p>
+          <a:p>
+            <a:endParaRPr lang="en-IN" sz="1800" dirty="0"/>
+          </a:p>
+          <a:p>
+            <a:endParaRPr lang="en-IN" sz="1800" dirty="0"/>
+          </a:p>
+        </p:txBody>
+      </p:sp>
+      <p:graphicFrame>
+        <p:nvGraphicFramePr>
+          <p:cNvPr id="4" name="Table 4">
+            <a:extLst>
+              <a:ext uri="{FF2B5EF4-FFF2-40B4-BE49-F238E27FC236}">
+                <a16:creationId xmlns:a16="http://schemas.microsoft.com/office/drawing/2014/main" id="{6B988656-3426-A144-BA96-4918478F28D1}"/>
+              </a:ext>
+            </a:extLst>
+          </p:cNvPr>
+          <p:cNvGraphicFramePr>
+            <a:graphicFrameLocks noGrp="1"/>
+          </p:cNvGraphicFramePr>
+          <p:nvPr>
+            <p:extLst>
+              <p:ext uri="{D42A27DB-BD31-4B8C-83A1-F6EECF244321}">
+                <p14:modId xmlns:p14="http://schemas.microsoft.com/office/powerpoint/2010/main" val="776915381"/>
+              </p:ext>
+            </p:extLst>
+          </p:nvPr>
+        </p:nvGraphicFramePr>
+        <p:xfrm>
+          <a:off x="814894" y="1853248"/>
+          <a:ext cx="10562211" cy="2805960"/>
+        </p:xfrm>
+        <a:graphic>
+          <a:graphicData uri="http://schemas.openxmlformats.org/drawingml/2006/table">
+            <a:tbl>
+              <a:tblPr firstRow="1" bandRow="1">
+                <a:tableStyleId>{5C22544A-7EE6-4342-B048-85BDC9FD1C3A}</a:tableStyleId>
+              </a:tblPr>
+              <a:tblGrid>
+                <a:gridCol w="3520737">
+                  <a:extLst>
+                    <a:ext uri="{9D8B030D-6E8A-4147-A177-3AD203B41FA5}">
+                      <a16:colId xmlns:a16="http://schemas.microsoft.com/office/drawing/2014/main" val="1553846055"/>
+                    </a:ext>
+                  </a:extLst>
+                </a:gridCol>
+                <a:gridCol w="3520737">
+                  <a:extLst>
+                    <a:ext uri="{9D8B030D-6E8A-4147-A177-3AD203B41FA5}">
+                      <a16:colId xmlns:a16="http://schemas.microsoft.com/office/drawing/2014/main" val="3803824806"/>
+                    </a:ext>
+                  </a:extLst>
+                </a:gridCol>
+                <a:gridCol w="3520737">
+                  <a:extLst>
+                    <a:ext uri="{9D8B030D-6E8A-4147-A177-3AD203B41FA5}">
+                      <a16:colId xmlns:a16="http://schemas.microsoft.com/office/drawing/2014/main" val="1058355846"/>
+                    </a:ext>
+                  </a:extLst>
+                </a:gridCol>
+              </a:tblGrid>
+              <a:tr h="701490">
+                <a:tc>
+                  <a:txBody>
+                    <a:bodyPr/>
+                    <a:lstStyle/>
+                    <a:p>
+                      <a:r>
+                        <a:rPr lang="en-IN" sz="2400" dirty="0"/>
+                        <a:t>Model Used</a:t>
+                      </a:r>
+                    </a:p>
+                  </a:txBody>
+                  <a:tcPr/>
+                </a:tc>
+                <a:tc>
+                  <a:txBody>
+                    <a:bodyPr/>
+                    <a:lstStyle/>
+                    <a:p>
+                      <a:r>
+                        <a:rPr lang="en-IN" sz="2400" dirty="0"/>
+                        <a:t>Accuracy</a:t>
+                      </a:r>
+                    </a:p>
+                  </a:txBody>
+                  <a:tcPr/>
+                </a:tc>
+                <a:tc>
+                  <a:txBody>
+                    <a:bodyPr/>
+                    <a:lstStyle/>
+                    <a:p>
+                      <a:r>
+                        <a:rPr lang="en-IN" sz="2400" dirty="0"/>
+                        <a:t>F1 Score</a:t>
+                      </a:r>
+                    </a:p>
+                  </a:txBody>
+                  <a:tcPr/>
+                </a:tc>
+                <a:extLst>
+                  <a:ext uri="{0D108BD9-81ED-4DB2-BD59-A6C34878D82A}">
+                    <a16:rowId xmlns:a16="http://schemas.microsoft.com/office/drawing/2014/main" val="2092274761"/>
+                  </a:ext>
+                </a:extLst>
+              </a:tr>
+              <a:tr h="701490">
+                <a:tc>
+                  <a:txBody>
+                    <a:bodyPr/>
+                    <a:lstStyle/>
+                    <a:p>
+                      <a:r>
+                        <a:rPr lang="en-IN" sz="2400" dirty="0"/>
+                        <a:t>KNN</a:t>
+                      </a:r>
+                    </a:p>
+                  </a:txBody>
+                  <a:tcPr/>
+                </a:tc>
+                <a:tc>
+                  <a:txBody>
+                    <a:bodyPr/>
+                    <a:lstStyle/>
+                    <a:p>
+                      <a:r>
+                        <a:rPr lang="en-IN" sz="2400" dirty="0"/>
+                        <a:t>63.45 %</a:t>
+                      </a:r>
+                    </a:p>
+                  </a:txBody>
+                  <a:tcPr/>
+                </a:tc>
+                <a:tc>
+                  <a:txBody>
+                    <a:bodyPr/>
+                    <a:lstStyle/>
+                    <a:p>
+                      <a:r>
+                        <a:rPr lang="en-IN" sz="2400" dirty="0"/>
+                        <a:t>60 %</a:t>
+                      </a:r>
+                    </a:p>
+                  </a:txBody>
+                  <a:tcPr/>
+                </a:tc>
+                <a:extLst>
+                  <a:ext uri="{0D108BD9-81ED-4DB2-BD59-A6C34878D82A}">
+                    <a16:rowId xmlns:a16="http://schemas.microsoft.com/office/drawing/2014/main" val="1580196882"/>
+                  </a:ext>
+                </a:extLst>
+              </a:tr>
+              <a:tr h="701490">
+                <a:tc>
+                  <a:txBody>
+                    <a:bodyPr/>
+                    <a:lstStyle/>
+                    <a:p>
+                      <a:r>
+                        <a:rPr lang="en-IN" sz="2400" dirty="0"/>
+                        <a:t>Logistic Regression</a:t>
+                      </a:r>
+                    </a:p>
+                  </a:txBody>
+                  <a:tcPr/>
+                </a:tc>
+                <a:tc>
+                  <a:txBody>
+                    <a:bodyPr/>
+                    <a:lstStyle/>
+                    <a:p>
+                      <a:r>
+                        <a:rPr lang="en-IN" sz="2400" dirty="0"/>
+                        <a:t>92.38 %</a:t>
+                      </a:r>
+                    </a:p>
+                  </a:txBody>
+                  <a:tcPr/>
+                </a:tc>
+                <a:tc>
+                  <a:txBody>
+                    <a:bodyPr/>
+                    <a:lstStyle/>
+                    <a:p>
+                      <a:r>
+                        <a:rPr lang="en-IN" sz="2400" dirty="0"/>
+                        <a:t>91.89 %</a:t>
+                      </a:r>
+                    </a:p>
+                  </a:txBody>
+                  <a:tcPr/>
+                </a:tc>
+                <a:extLst>
+                  <a:ext uri="{0D108BD9-81ED-4DB2-BD59-A6C34878D82A}">
+                    <a16:rowId xmlns:a16="http://schemas.microsoft.com/office/drawing/2014/main" val="3449307950"/>
+                  </a:ext>
+                </a:extLst>
+              </a:tr>
+              <a:tr h="701490">
+                <a:tc>
+                  <a:txBody>
+                    <a:bodyPr/>
+                    <a:lstStyle/>
+                    <a:p>
+                      <a:r>
+                        <a:rPr lang="en-IN" sz="2400" b="1" dirty="0"/>
+                        <a:t>Random Forest</a:t>
+                      </a:r>
+                    </a:p>
+                  </a:txBody>
+                  <a:tcPr/>
+                </a:tc>
+                <a:tc>
+                  <a:txBody>
+                    <a:bodyPr/>
+                    <a:lstStyle/>
+                    <a:p>
+                      <a:r>
+                        <a:rPr lang="en-IN" sz="2400" b="1" dirty="0"/>
+                        <a:t>93.90 %</a:t>
+                      </a:r>
+                    </a:p>
+                  </a:txBody>
+                  <a:tcPr/>
+                </a:tc>
+                <a:tc>
+                  <a:txBody>
+                    <a:bodyPr/>
+                    <a:lstStyle/>
+                    <a:p>
+                      <a:r>
+                        <a:rPr lang="en-IN" sz="2400" b="1" dirty="0"/>
+                        <a:t>93.47 %</a:t>
+                      </a:r>
+                    </a:p>
+                  </a:txBody>
+                  <a:tcPr/>
+                </a:tc>
+                <a:extLst>
+                  <a:ext uri="{0D108BD9-81ED-4DB2-BD59-A6C34878D82A}">
+                    <a16:rowId xmlns:a16="http://schemas.microsoft.com/office/drawing/2014/main" val="2526346541"/>
+                  </a:ext>
+                </a:extLst>
+              </a:tr>
+            </a:tbl>
+          </a:graphicData>
+        </a:graphic>
+      </p:graphicFrame>
+    </p:spTree>
+    <p:extLst>
+      <p:ext uri="{BB962C8B-B14F-4D97-AF65-F5344CB8AC3E}">
+        <p14:creationId xmlns:p14="http://schemas.microsoft.com/office/powerpoint/2010/main" val="108764919"/>
       </p:ext>
     </p:extLst>
   </p:cSld>
@@ -6426,6 +7155,759 @@
     <p:extLst>
       <p:ext uri="{BB962C8B-B14F-4D97-AF65-F5344CB8AC3E}">
         <p14:creationId xmlns:p14="http://schemas.microsoft.com/office/powerpoint/2010/main" val="3424752357"/>
+      </p:ext>
+    </p:extLst>
+  </p:cSld>
+  <p:clrMapOvr>
+    <a:masterClrMapping/>
+  </p:clrMapOvr>
+</p:sld>
+</file>
+
+<file path=ppt/slides/slide4.xml><?xml version="1.0" encoding="utf-8"?>
+<p:sld xmlns:a="http://schemas.openxmlformats.org/drawingml/2006/main" xmlns:r="http://schemas.openxmlformats.org/officeDocument/2006/relationships" xmlns:p="http://schemas.openxmlformats.org/presentationml/2006/main">
+  <p:cSld>
+    <p:spTree>
+      <p:nvGrpSpPr>
+        <p:cNvPr id="1" name=""/>
+        <p:cNvGrpSpPr/>
+        <p:nvPr/>
+      </p:nvGrpSpPr>
+      <p:grpSpPr>
+        <a:xfrm>
+          <a:off x="0" y="0"/>
+          <a:ext cx="0" cy="0"/>
+          <a:chOff x="0" y="0"/>
+          <a:chExt cx="0" cy="0"/>
+        </a:xfrm>
+      </p:grpSpPr>
+      <p:sp>
+        <p:nvSpPr>
+          <p:cNvPr id="2" name="Title 1">
+            <a:extLst>
+              <a:ext uri="{FF2B5EF4-FFF2-40B4-BE49-F238E27FC236}">
+                <a16:creationId xmlns:a16="http://schemas.microsoft.com/office/drawing/2014/main" id="{FECC09DB-CAD9-CBC2-74FF-B604908EEC8B}"/>
+              </a:ext>
+            </a:extLst>
+          </p:cNvPr>
+          <p:cNvSpPr>
+            <a:spLocks noGrp="1"/>
+          </p:cNvSpPr>
+          <p:nvPr>
+            <p:ph type="title"/>
+          </p:nvPr>
+        </p:nvSpPr>
+        <p:spPr/>
+        <p:txBody>
+          <a:bodyPr/>
+          <a:lstStyle/>
+          <a:p>
+            <a:r>
+              <a:rPr lang="en-IN" dirty="0"/>
+              <a:t>Data Analysis</a:t>
+            </a:r>
+          </a:p>
+        </p:txBody>
+      </p:sp>
+      <p:sp>
+        <p:nvSpPr>
+          <p:cNvPr id="3" name="Content Placeholder 2">
+            <a:extLst>
+              <a:ext uri="{FF2B5EF4-FFF2-40B4-BE49-F238E27FC236}">
+                <a16:creationId xmlns:a16="http://schemas.microsoft.com/office/drawing/2014/main" id="{592DEA4B-F35E-866E-7AE4-14597AFE244D}"/>
+              </a:ext>
+            </a:extLst>
+          </p:cNvPr>
+          <p:cNvSpPr>
+            <a:spLocks noGrp="1"/>
+          </p:cNvSpPr>
+          <p:nvPr>
+            <p:ph idx="1"/>
+          </p:nvPr>
+        </p:nvSpPr>
+        <p:spPr>
+          <a:xfrm>
+            <a:off x="448149" y="1715680"/>
+            <a:ext cx="6348578" cy="4617562"/>
+          </a:xfrm>
+        </p:spPr>
+        <p:txBody>
+          <a:bodyPr>
+            <a:normAutofit/>
+          </a:bodyPr>
+          <a:lstStyle/>
+          <a:p>
+            <a:r>
+              <a:rPr lang="en-US" dirty="0"/>
+              <a:t>It was found out that Data is having  2,84,807 rows and 31 columns.</a:t>
+            </a:r>
+          </a:p>
+          <a:p>
+            <a:pPr marL="0" indent="0">
+              <a:buNone/>
+            </a:pPr>
+            <a:endParaRPr lang="en-US" dirty="0"/>
+          </a:p>
+          <a:p>
+            <a:r>
+              <a:rPr lang="en-US" dirty="0"/>
+              <a:t>Class = 1 Signifies Fraudulent Transaction, Class = 0 signifies legit transaction.</a:t>
+            </a:r>
+          </a:p>
+          <a:p>
+            <a:pPr marL="0" indent="0">
+              <a:buNone/>
+            </a:pPr>
+            <a:endParaRPr lang="en-US" dirty="0"/>
+          </a:p>
+          <a:p>
+            <a:r>
+              <a:rPr lang="en-US" dirty="0"/>
+              <a:t>It was found out that out of 2,84,807 Transactions, only 492 were legit.</a:t>
+            </a:r>
+          </a:p>
+          <a:p>
+            <a:pPr marL="0" indent="0">
+              <a:buNone/>
+            </a:pPr>
+            <a:endParaRPr lang="en-US" dirty="0"/>
+          </a:p>
+          <a:p>
+            <a:r>
+              <a:rPr lang="en-US" dirty="0"/>
+              <a:t>This implies that the data is severely unbalanced, and we will have to balance it before training the models.</a:t>
+            </a:r>
+          </a:p>
+          <a:p>
+            <a:endParaRPr lang="en-US" dirty="0"/>
+          </a:p>
+          <a:p>
+            <a:endParaRPr lang="en-US" dirty="0"/>
+          </a:p>
+        </p:txBody>
+      </p:sp>
+      <p:pic>
+        <p:nvPicPr>
+          <p:cNvPr id="5" name="Picture 4">
+            <a:extLst>
+              <a:ext uri="{FF2B5EF4-FFF2-40B4-BE49-F238E27FC236}">
+                <a16:creationId xmlns:a16="http://schemas.microsoft.com/office/drawing/2014/main" id="{B6EFC6C3-2195-4666-84BC-6B85D3ED99AE}"/>
+              </a:ext>
+            </a:extLst>
+          </p:cNvPr>
+          <p:cNvPicPr>
+            <a:picLocks noChangeAspect="1"/>
+          </p:cNvPicPr>
+          <p:nvPr/>
+        </p:nvPicPr>
+        <p:blipFill>
+          <a:blip r:embed="rId2">
+            <a:extLst>
+              <a:ext uri="{28A0092B-C50C-407E-A947-70E740481C1C}">
+                <a14:useLocalDpi xmlns:a14="http://schemas.microsoft.com/office/drawing/2010/main" val="0"/>
+              </a:ext>
+            </a:extLst>
+          </a:blip>
+          <a:stretch>
+            <a:fillRect/>
+          </a:stretch>
+        </p:blipFill>
+        <p:spPr>
+          <a:xfrm>
+            <a:off x="7079300" y="2164103"/>
+            <a:ext cx="4664551" cy="3489084"/>
+          </a:xfrm>
+          <a:prstGeom prst="rect">
+            <a:avLst/>
+          </a:prstGeom>
+        </p:spPr>
+      </p:pic>
+    </p:spTree>
+    <p:extLst>
+      <p:ext uri="{BB962C8B-B14F-4D97-AF65-F5344CB8AC3E}">
+        <p14:creationId xmlns:p14="http://schemas.microsoft.com/office/powerpoint/2010/main" val="1051792957"/>
+      </p:ext>
+    </p:extLst>
+  </p:cSld>
+  <p:clrMapOvr>
+    <a:masterClrMapping/>
+  </p:clrMapOvr>
+</p:sld>
+</file>
+
+<file path=ppt/slides/slide5.xml><?xml version="1.0" encoding="utf-8"?>
+<p:sld xmlns:a="http://schemas.openxmlformats.org/drawingml/2006/main" xmlns:r="http://schemas.openxmlformats.org/officeDocument/2006/relationships" xmlns:p="http://schemas.openxmlformats.org/presentationml/2006/main">
+  <p:cSld>
+    <p:spTree>
+      <p:nvGrpSpPr>
+        <p:cNvPr id="1" name=""/>
+        <p:cNvGrpSpPr/>
+        <p:nvPr/>
+      </p:nvGrpSpPr>
+      <p:grpSpPr>
+        <a:xfrm>
+          <a:off x="0" y="0"/>
+          <a:ext cx="0" cy="0"/>
+          <a:chOff x="0" y="0"/>
+          <a:chExt cx="0" cy="0"/>
+        </a:xfrm>
+      </p:grpSpPr>
+      <p:sp>
+        <p:nvSpPr>
+          <p:cNvPr id="2" name="Title 1">
+            <a:extLst>
+              <a:ext uri="{FF2B5EF4-FFF2-40B4-BE49-F238E27FC236}">
+                <a16:creationId xmlns:a16="http://schemas.microsoft.com/office/drawing/2014/main" id="{77849803-4DE2-517C-81DA-D9943096D1CC}"/>
+              </a:ext>
+            </a:extLst>
+          </p:cNvPr>
+          <p:cNvSpPr>
+            <a:spLocks noGrp="1"/>
+          </p:cNvSpPr>
+          <p:nvPr>
+            <p:ph type="title"/>
+          </p:nvPr>
+        </p:nvSpPr>
+        <p:spPr/>
+        <p:txBody>
+          <a:bodyPr/>
+          <a:lstStyle/>
+          <a:p>
+            <a:r>
+              <a:rPr lang="en-IN" dirty="0"/>
+              <a:t>Basic Outline to build each Model</a:t>
+            </a:r>
+          </a:p>
+        </p:txBody>
+      </p:sp>
+      <p:sp>
+        <p:nvSpPr>
+          <p:cNvPr id="3" name="Content Placeholder 2">
+            <a:extLst>
+              <a:ext uri="{FF2B5EF4-FFF2-40B4-BE49-F238E27FC236}">
+                <a16:creationId xmlns:a16="http://schemas.microsoft.com/office/drawing/2014/main" id="{10CF7294-09F7-C49B-0B9A-EBF59B47BD45}"/>
+              </a:ext>
+            </a:extLst>
+          </p:cNvPr>
+          <p:cNvSpPr>
+            <a:spLocks noGrp="1"/>
+          </p:cNvSpPr>
+          <p:nvPr>
+            <p:ph idx="1"/>
+          </p:nvPr>
+        </p:nvSpPr>
+        <p:spPr>
+          <a:xfrm>
+            <a:off x="646111" y="1853248"/>
+            <a:ext cx="10713188" cy="4885345"/>
+          </a:xfrm>
+        </p:spPr>
+        <p:txBody>
+          <a:bodyPr>
+            <a:normAutofit lnSpcReduction="10000"/>
+          </a:bodyPr>
+          <a:lstStyle/>
+          <a:p>
+            <a:r>
+              <a:rPr lang="en-IN" dirty="0"/>
+              <a:t>Loading the Data</a:t>
+            </a:r>
+          </a:p>
+          <a:p>
+            <a:pPr marL="0" indent="0">
+              <a:buNone/>
+            </a:pPr>
+            <a:endParaRPr lang="en-IN" dirty="0"/>
+          </a:p>
+          <a:p>
+            <a:r>
+              <a:rPr lang="en-IN" dirty="0"/>
+              <a:t>Balancing the data</a:t>
+            </a:r>
+          </a:p>
+          <a:p>
+            <a:pPr marL="0" indent="0">
+              <a:buNone/>
+            </a:pPr>
+            <a:endParaRPr lang="en-IN" dirty="0"/>
+          </a:p>
+          <a:p>
+            <a:r>
+              <a:rPr lang="en-IN" dirty="0"/>
+              <a:t>Splitting the data into Test and Train Dataset</a:t>
+            </a:r>
+          </a:p>
+          <a:p>
+            <a:pPr marL="0" indent="0">
+              <a:buNone/>
+            </a:pPr>
+            <a:endParaRPr lang="en-IN" dirty="0"/>
+          </a:p>
+          <a:p>
+            <a:r>
+              <a:rPr lang="en-IN" dirty="0"/>
+              <a:t>Tuning the Model</a:t>
+            </a:r>
+          </a:p>
+          <a:p>
+            <a:pPr marL="0" indent="0">
+              <a:buNone/>
+            </a:pPr>
+            <a:endParaRPr lang="en-IN" dirty="0"/>
+          </a:p>
+          <a:p>
+            <a:r>
+              <a:rPr lang="en-IN" dirty="0"/>
+              <a:t>Evaluating the Model by finding Accuracy, Precision, Recall &amp; F1 Score for the given model</a:t>
+            </a:r>
+          </a:p>
+          <a:p>
+            <a:pPr marL="0" indent="0">
+              <a:buNone/>
+            </a:pPr>
+            <a:endParaRPr lang="en-IN" dirty="0"/>
+          </a:p>
+          <a:p>
+            <a:r>
+              <a:rPr lang="en-IN" dirty="0"/>
+              <a:t>Pickling the Model</a:t>
+            </a:r>
+          </a:p>
+        </p:txBody>
+      </p:sp>
+    </p:spTree>
+    <p:extLst>
+      <p:ext uri="{BB962C8B-B14F-4D97-AF65-F5344CB8AC3E}">
+        <p14:creationId xmlns:p14="http://schemas.microsoft.com/office/powerpoint/2010/main" val="3034234672"/>
+      </p:ext>
+    </p:extLst>
+  </p:cSld>
+  <p:clrMapOvr>
+    <a:masterClrMapping/>
+  </p:clrMapOvr>
+</p:sld>
+</file>
+
+<file path=ppt/slides/slide6.xml><?xml version="1.0" encoding="utf-8"?>
+<p:sld xmlns:a="http://schemas.openxmlformats.org/drawingml/2006/main" xmlns:r="http://schemas.openxmlformats.org/officeDocument/2006/relationships" xmlns:p="http://schemas.openxmlformats.org/presentationml/2006/main">
+  <p:cSld>
+    <p:spTree>
+      <p:nvGrpSpPr>
+        <p:cNvPr id="1" name=""/>
+        <p:cNvGrpSpPr/>
+        <p:nvPr/>
+      </p:nvGrpSpPr>
+      <p:grpSpPr>
+        <a:xfrm>
+          <a:off x="0" y="0"/>
+          <a:ext cx="0" cy="0"/>
+          <a:chOff x="0" y="0"/>
+          <a:chExt cx="0" cy="0"/>
+        </a:xfrm>
+      </p:grpSpPr>
+      <p:sp>
+        <p:nvSpPr>
+          <p:cNvPr id="2" name="Title 1">
+            <a:extLst>
+              <a:ext uri="{FF2B5EF4-FFF2-40B4-BE49-F238E27FC236}">
+                <a16:creationId xmlns:a16="http://schemas.microsoft.com/office/drawing/2014/main" id="{991D4287-038C-3B89-FC87-15EF102632CA}"/>
+              </a:ext>
+            </a:extLst>
+          </p:cNvPr>
+          <p:cNvSpPr>
+            <a:spLocks noGrp="1"/>
+          </p:cNvSpPr>
+          <p:nvPr>
+            <p:ph type="title"/>
+          </p:nvPr>
+        </p:nvSpPr>
+        <p:spPr/>
+        <p:txBody>
+          <a:bodyPr/>
+          <a:lstStyle/>
+          <a:p>
+            <a:r>
+              <a:rPr lang="en-IN" dirty="0"/>
+              <a:t>Models Used</a:t>
+            </a:r>
+          </a:p>
+        </p:txBody>
+      </p:sp>
+      <p:sp>
+        <p:nvSpPr>
+          <p:cNvPr id="3" name="Content Placeholder 2">
+            <a:extLst>
+              <a:ext uri="{FF2B5EF4-FFF2-40B4-BE49-F238E27FC236}">
+                <a16:creationId xmlns:a16="http://schemas.microsoft.com/office/drawing/2014/main" id="{1DB8E3F3-6697-6DA4-4365-854375C54A00}"/>
+              </a:ext>
+            </a:extLst>
+          </p:cNvPr>
+          <p:cNvSpPr>
+            <a:spLocks noGrp="1"/>
+          </p:cNvSpPr>
+          <p:nvPr>
+            <p:ph idx="1"/>
+          </p:nvPr>
+        </p:nvSpPr>
+        <p:spPr>
+          <a:xfrm>
+            <a:off x="283180" y="1319752"/>
+            <a:ext cx="11688861" cy="5538247"/>
+          </a:xfrm>
+        </p:spPr>
+        <p:txBody>
+          <a:bodyPr>
+            <a:normAutofit/>
+          </a:bodyPr>
+          <a:lstStyle/>
+          <a:p>
+            <a:r>
+              <a:rPr lang="en-IN" sz="2400" dirty="0"/>
+              <a:t>KNN (K-Nearest Neighbours)  </a:t>
+            </a:r>
+            <a:endParaRPr lang="en-US" dirty="0"/>
+          </a:p>
+          <a:p>
+            <a:pPr marL="0" indent="0">
+              <a:buNone/>
+            </a:pPr>
+            <a:r>
+              <a:rPr lang="en-US" dirty="0"/>
+              <a:t>It works by finding the K nearest neighbors to the new instance from the training data and then assigning the class label of the majority of those neighbors to the new instance.</a:t>
+            </a:r>
+          </a:p>
+          <a:p>
+            <a:pPr marL="0" indent="0">
+              <a:buNone/>
+            </a:pPr>
+            <a:endParaRPr lang="en-US" dirty="0"/>
+          </a:p>
+          <a:p>
+            <a:r>
+              <a:rPr lang="en-US" sz="2400" dirty="0"/>
+              <a:t>Logistic Regression</a:t>
+            </a:r>
+          </a:p>
+          <a:p>
+            <a:pPr marL="0" indent="0">
+              <a:buNone/>
+            </a:pPr>
+            <a:r>
+              <a:rPr lang="en-US" dirty="0"/>
+              <a:t>It models the probability of the target variable taking a particular value based on a set of input features. The output of logistic regression is a probability score between 0 and 1, which can be interpreted as the likelihood of the instance belonging to the positive class.</a:t>
+            </a:r>
+          </a:p>
+          <a:p>
+            <a:pPr marL="0" indent="0">
+              <a:buNone/>
+            </a:pPr>
+            <a:endParaRPr lang="en-US" dirty="0"/>
+          </a:p>
+          <a:p>
+            <a:r>
+              <a:rPr lang="en-US" sz="2400" dirty="0"/>
+              <a:t>Random Forest</a:t>
+            </a:r>
+          </a:p>
+          <a:p>
+            <a:pPr marL="0" indent="0">
+              <a:buNone/>
+            </a:pPr>
+            <a:r>
+              <a:rPr lang="en-US" dirty="0"/>
+              <a:t>It is an ensemble learning method that combines multiple decision trees to create a more accurate and robust model. Decision Tree is a tree-based model that recursively splits the input data into smaller subsets based on the values of the input features, and makes predictions based on the resulting subsets.</a:t>
+            </a:r>
+            <a:endParaRPr lang="en-IN" dirty="0"/>
+          </a:p>
+          <a:p>
+            <a:endParaRPr lang="en-IN" dirty="0"/>
+          </a:p>
+        </p:txBody>
+      </p:sp>
+    </p:spTree>
+    <p:extLst>
+      <p:ext uri="{BB962C8B-B14F-4D97-AF65-F5344CB8AC3E}">
+        <p14:creationId xmlns:p14="http://schemas.microsoft.com/office/powerpoint/2010/main" val="2847194793"/>
+      </p:ext>
+    </p:extLst>
+  </p:cSld>
+  <p:clrMapOvr>
+    <a:masterClrMapping/>
+  </p:clrMapOvr>
+</p:sld>
+</file>
+
+<file path=ppt/slides/slide7.xml><?xml version="1.0" encoding="utf-8"?>
+<p:sld xmlns:a="http://schemas.openxmlformats.org/drawingml/2006/main" xmlns:r="http://schemas.openxmlformats.org/officeDocument/2006/relationships" xmlns:p="http://schemas.openxmlformats.org/presentationml/2006/main">
+  <p:cSld>
+    <p:spTree>
+      <p:nvGrpSpPr>
+        <p:cNvPr id="1" name=""/>
+        <p:cNvGrpSpPr/>
+        <p:nvPr/>
+      </p:nvGrpSpPr>
+      <p:grpSpPr>
+        <a:xfrm>
+          <a:off x="0" y="0"/>
+          <a:ext cx="0" cy="0"/>
+          <a:chOff x="0" y="0"/>
+          <a:chExt cx="0" cy="0"/>
+        </a:xfrm>
+      </p:grpSpPr>
+      <p:sp>
+        <p:nvSpPr>
+          <p:cNvPr id="2" name="Title 1">
+            <a:extLst>
+              <a:ext uri="{FF2B5EF4-FFF2-40B4-BE49-F238E27FC236}">
+                <a16:creationId xmlns:a16="http://schemas.microsoft.com/office/drawing/2014/main" id="{991D4287-038C-3B89-FC87-15EF102632CA}"/>
+              </a:ext>
+            </a:extLst>
+          </p:cNvPr>
+          <p:cNvSpPr>
+            <a:spLocks noGrp="1"/>
+          </p:cNvSpPr>
+          <p:nvPr>
+            <p:ph type="title"/>
+          </p:nvPr>
+        </p:nvSpPr>
+        <p:spPr/>
+        <p:txBody>
+          <a:bodyPr/>
+          <a:lstStyle/>
+          <a:p>
+            <a:r>
+              <a:rPr lang="en-IN" dirty="0"/>
+              <a:t>Evaluating KNN</a:t>
+            </a:r>
+          </a:p>
+        </p:txBody>
+      </p:sp>
+      <p:pic>
+        <p:nvPicPr>
+          <p:cNvPr id="7" name="Picture 6">
+            <a:extLst>
+              <a:ext uri="{FF2B5EF4-FFF2-40B4-BE49-F238E27FC236}">
+                <a16:creationId xmlns:a16="http://schemas.microsoft.com/office/drawing/2014/main" id="{824EAC84-3CE5-23C8-3601-980D4788AE92}"/>
+              </a:ext>
+            </a:extLst>
+          </p:cNvPr>
+          <p:cNvPicPr>
+            <a:picLocks noChangeAspect="1"/>
+          </p:cNvPicPr>
+          <p:nvPr/>
+        </p:nvPicPr>
+        <p:blipFill>
+          <a:blip r:embed="rId2">
+            <a:extLst>
+              <a:ext uri="{28A0092B-C50C-407E-A947-70E740481C1C}">
+                <a14:useLocalDpi xmlns:a14="http://schemas.microsoft.com/office/drawing/2010/main" val="0"/>
+              </a:ext>
+            </a:extLst>
+          </a:blip>
+          <a:stretch>
+            <a:fillRect/>
+          </a:stretch>
+        </p:blipFill>
+        <p:spPr>
+          <a:xfrm>
+            <a:off x="1101655" y="1655286"/>
+            <a:ext cx="9835299" cy="4666383"/>
+          </a:xfrm>
+          <a:prstGeom prst="rect">
+            <a:avLst/>
+          </a:prstGeom>
+        </p:spPr>
+      </p:pic>
+    </p:spTree>
+    <p:extLst>
+      <p:ext uri="{BB962C8B-B14F-4D97-AF65-F5344CB8AC3E}">
+        <p14:creationId xmlns:p14="http://schemas.microsoft.com/office/powerpoint/2010/main" val="4001273322"/>
+      </p:ext>
+    </p:extLst>
+  </p:cSld>
+  <p:clrMapOvr>
+    <a:masterClrMapping/>
+  </p:clrMapOvr>
+</p:sld>
+</file>
+
+<file path=ppt/slides/slide8.xml><?xml version="1.0" encoding="utf-8"?>
+<p:sld xmlns:a="http://schemas.openxmlformats.org/drawingml/2006/main" xmlns:r="http://schemas.openxmlformats.org/officeDocument/2006/relationships" xmlns:p="http://schemas.openxmlformats.org/presentationml/2006/main">
+  <p:cSld>
+    <p:spTree>
+      <p:nvGrpSpPr>
+        <p:cNvPr id="1" name=""/>
+        <p:cNvGrpSpPr/>
+        <p:nvPr/>
+      </p:nvGrpSpPr>
+      <p:grpSpPr>
+        <a:xfrm>
+          <a:off x="0" y="0"/>
+          <a:ext cx="0" cy="0"/>
+          <a:chOff x="0" y="0"/>
+          <a:chExt cx="0" cy="0"/>
+        </a:xfrm>
+      </p:grpSpPr>
+      <p:sp>
+        <p:nvSpPr>
+          <p:cNvPr id="2" name="Title 1">
+            <a:extLst>
+              <a:ext uri="{FF2B5EF4-FFF2-40B4-BE49-F238E27FC236}">
+                <a16:creationId xmlns:a16="http://schemas.microsoft.com/office/drawing/2014/main" id="{991D4287-038C-3B89-FC87-15EF102632CA}"/>
+              </a:ext>
+            </a:extLst>
+          </p:cNvPr>
+          <p:cNvSpPr>
+            <a:spLocks noGrp="1"/>
+          </p:cNvSpPr>
+          <p:nvPr>
+            <p:ph type="title"/>
+          </p:nvPr>
+        </p:nvSpPr>
+        <p:spPr/>
+        <p:txBody>
+          <a:bodyPr/>
+          <a:lstStyle/>
+          <a:p>
+            <a:r>
+              <a:rPr lang="en-IN" dirty="0"/>
+              <a:t>Evaluating Logistic Regression</a:t>
+            </a:r>
+          </a:p>
+        </p:txBody>
+      </p:sp>
+      <p:pic>
+        <p:nvPicPr>
+          <p:cNvPr id="7" name="Picture 6">
+            <a:extLst>
+              <a:ext uri="{FF2B5EF4-FFF2-40B4-BE49-F238E27FC236}">
+                <a16:creationId xmlns:a16="http://schemas.microsoft.com/office/drawing/2014/main" id="{824EAC84-3CE5-23C8-3601-980D4788AE92}"/>
+              </a:ext>
+            </a:extLst>
+          </p:cNvPr>
+          <p:cNvPicPr>
+            <a:picLocks noChangeAspect="1"/>
+          </p:cNvPicPr>
+          <p:nvPr/>
+        </p:nvPicPr>
+        <p:blipFill>
+          <a:blip r:embed="rId2">
+            <a:extLst>
+              <a:ext uri="{28A0092B-C50C-407E-A947-70E740481C1C}">
+                <a14:useLocalDpi xmlns:a14="http://schemas.microsoft.com/office/drawing/2010/main" val="0"/>
+              </a:ext>
+            </a:extLst>
+          </a:blip>
+          <a:srcRect/>
+          <a:stretch/>
+        </p:blipFill>
+        <p:spPr>
+          <a:xfrm>
+            <a:off x="1104710" y="1655286"/>
+            <a:ext cx="9829189" cy="4666383"/>
+          </a:xfrm>
+          <a:prstGeom prst="rect">
+            <a:avLst/>
+          </a:prstGeom>
+        </p:spPr>
+      </p:pic>
+    </p:spTree>
+    <p:extLst>
+      <p:ext uri="{BB962C8B-B14F-4D97-AF65-F5344CB8AC3E}">
+        <p14:creationId xmlns:p14="http://schemas.microsoft.com/office/powerpoint/2010/main" val="3752312978"/>
+      </p:ext>
+    </p:extLst>
+  </p:cSld>
+  <p:clrMapOvr>
+    <a:masterClrMapping/>
+  </p:clrMapOvr>
+</p:sld>
+</file>
+
+<file path=ppt/slides/slide9.xml><?xml version="1.0" encoding="utf-8"?>
+<p:sld xmlns:a="http://schemas.openxmlformats.org/drawingml/2006/main" xmlns:r="http://schemas.openxmlformats.org/officeDocument/2006/relationships" xmlns:p="http://schemas.openxmlformats.org/presentationml/2006/main">
+  <p:cSld>
+    <p:spTree>
+      <p:nvGrpSpPr>
+        <p:cNvPr id="1" name=""/>
+        <p:cNvGrpSpPr/>
+        <p:nvPr/>
+      </p:nvGrpSpPr>
+      <p:grpSpPr>
+        <a:xfrm>
+          <a:off x="0" y="0"/>
+          <a:ext cx="0" cy="0"/>
+          <a:chOff x="0" y="0"/>
+          <a:chExt cx="0" cy="0"/>
+        </a:xfrm>
+      </p:grpSpPr>
+      <p:sp>
+        <p:nvSpPr>
+          <p:cNvPr id="2" name="Title 1">
+            <a:extLst>
+              <a:ext uri="{FF2B5EF4-FFF2-40B4-BE49-F238E27FC236}">
+                <a16:creationId xmlns:a16="http://schemas.microsoft.com/office/drawing/2014/main" id="{991D4287-038C-3B89-FC87-15EF102632CA}"/>
+              </a:ext>
+            </a:extLst>
+          </p:cNvPr>
+          <p:cNvSpPr>
+            <a:spLocks noGrp="1"/>
+          </p:cNvSpPr>
+          <p:nvPr>
+            <p:ph type="title"/>
+          </p:nvPr>
+        </p:nvSpPr>
+        <p:spPr/>
+        <p:txBody>
+          <a:bodyPr/>
+          <a:lstStyle/>
+          <a:p>
+            <a:r>
+              <a:rPr lang="en-IN" dirty="0"/>
+              <a:t>Evaluating Random Forest</a:t>
+            </a:r>
+          </a:p>
+        </p:txBody>
+      </p:sp>
+      <p:pic>
+        <p:nvPicPr>
+          <p:cNvPr id="7" name="Picture 6">
+            <a:extLst>
+              <a:ext uri="{FF2B5EF4-FFF2-40B4-BE49-F238E27FC236}">
+                <a16:creationId xmlns:a16="http://schemas.microsoft.com/office/drawing/2014/main" id="{824EAC84-3CE5-23C8-3601-980D4788AE92}"/>
+              </a:ext>
+            </a:extLst>
+          </p:cNvPr>
+          <p:cNvPicPr>
+            <a:picLocks noChangeAspect="1"/>
+          </p:cNvPicPr>
+          <p:nvPr/>
+        </p:nvPicPr>
+        <p:blipFill>
+          <a:blip r:embed="rId2">
+            <a:extLst>
+              <a:ext uri="{28A0092B-C50C-407E-A947-70E740481C1C}">
+                <a14:useLocalDpi xmlns:a14="http://schemas.microsoft.com/office/drawing/2010/main" val="0"/>
+              </a:ext>
+            </a:extLst>
+          </a:blip>
+          <a:srcRect/>
+          <a:stretch/>
+        </p:blipFill>
+        <p:spPr>
+          <a:xfrm>
+            <a:off x="1132704" y="1655286"/>
+            <a:ext cx="9773201" cy="4666383"/>
+          </a:xfrm>
+          <a:prstGeom prst="rect">
+            <a:avLst/>
+          </a:prstGeom>
+        </p:spPr>
+      </p:pic>
+    </p:spTree>
+    <p:extLst>
+      <p:ext uri="{BB962C8B-B14F-4D97-AF65-F5344CB8AC3E}">
+        <p14:creationId xmlns:p14="http://schemas.microsoft.com/office/powerpoint/2010/main" val="869105668"/>
       </p:ext>
     </p:extLst>
   </p:cSld>

</xml_diff>